<commit_message>
Cleaning up Notebooks, create workfiles directory, update READ.ME and NYT Analysis.docx
</commit_message>
<xml_diff>
--- a/Group 5 Project 1 PowerPoint.pptx
+++ b/Group 5 Project 1 PowerPoint.pptx
@@ -5,7 +5,7 @@
     <p:sldMasterId id="2147483648" r:id="rId1"/>
   </p:sldMasterIdLst>
   <p:notesMasterIdLst>
-    <p:notesMasterId r:id="rId21"/>
+    <p:notesMasterId r:id="rId20"/>
   </p:notesMasterIdLst>
   <p:sldIdLst>
     <p:sldId id="256" r:id="rId2"/>
@@ -25,8 +25,7 @@
     <p:sldId id="269" r:id="rId16"/>
     <p:sldId id="274" r:id="rId17"/>
     <p:sldId id="276" r:id="rId18"/>
-    <p:sldId id="277" r:id="rId19"/>
-    <p:sldId id="273" r:id="rId20"/>
+    <p:sldId id="273" r:id="rId19"/>
   </p:sldIdLst>
   <p:sldSz cx="12192000" cy="6858000"/>
   <p:notesSz cx="6858000" cy="9144000"/>
@@ -2509,7 +2508,7 @@
           <a:p>
             <a:fld id="{78E267B2-D7C0-4F13-9700-DA0DFE5D8BEF}" type="datetimeFigureOut">
               <a:rPr lang="en-US" smtClean="0"/>
-              <a:t>10/9/2019</a:t>
+              <a:t>3/9/2020</a:t>
             </a:fld>
             <a:endParaRPr lang="en-US"/>
           </a:p>
@@ -2923,7 +2922,7 @@
           <a:p>
             <a:fld id="{16359517-56A1-4CAF-BF01-997A9DD231B8}" type="datetimeFigureOut">
               <a:rPr lang="en-US" smtClean="0"/>
-              <a:t>10/9/2019</a:t>
+              <a:t>3/9/2020</a:t>
             </a:fld>
             <a:endParaRPr lang="en-US" dirty="0"/>
           </a:p>
@@ -3121,7 +3120,7 @@
           <a:p>
             <a:fld id="{16359517-56A1-4CAF-BF01-997A9DD231B8}" type="datetimeFigureOut">
               <a:rPr lang="en-US" smtClean="0"/>
-              <a:t>10/9/2019</a:t>
+              <a:t>3/9/2020</a:t>
             </a:fld>
             <a:endParaRPr lang="en-US" dirty="0"/>
           </a:p>
@@ -3329,7 +3328,7 @@
           <a:p>
             <a:fld id="{16359517-56A1-4CAF-BF01-997A9DD231B8}" type="datetimeFigureOut">
               <a:rPr lang="en-US" smtClean="0"/>
-              <a:t>10/9/2019</a:t>
+              <a:t>3/9/2020</a:t>
             </a:fld>
             <a:endParaRPr lang="en-US" dirty="0"/>
           </a:p>
@@ -3527,7 +3526,7 @@
           <a:p>
             <a:fld id="{16359517-56A1-4CAF-BF01-997A9DD231B8}" type="datetimeFigureOut">
               <a:rPr lang="en-US" smtClean="0"/>
-              <a:t>10/9/2019</a:t>
+              <a:t>3/9/2020</a:t>
             </a:fld>
             <a:endParaRPr lang="en-US" dirty="0"/>
           </a:p>
@@ -3802,7 +3801,7 @@
           <a:p>
             <a:fld id="{16359517-56A1-4CAF-BF01-997A9DD231B8}" type="datetimeFigureOut">
               <a:rPr lang="en-US" smtClean="0"/>
-              <a:t>10/9/2019</a:t>
+              <a:t>3/9/2020</a:t>
             </a:fld>
             <a:endParaRPr lang="en-US" dirty="0"/>
           </a:p>
@@ -4067,7 +4066,7 @@
           <a:p>
             <a:fld id="{16359517-56A1-4CAF-BF01-997A9DD231B8}" type="datetimeFigureOut">
               <a:rPr lang="en-US" smtClean="0"/>
-              <a:t>10/9/2019</a:t>
+              <a:t>3/9/2020</a:t>
             </a:fld>
             <a:endParaRPr lang="en-US" dirty="0"/>
           </a:p>
@@ -4479,7 +4478,7 @@
           <a:p>
             <a:fld id="{16359517-56A1-4CAF-BF01-997A9DD231B8}" type="datetimeFigureOut">
               <a:rPr lang="en-US" smtClean="0"/>
-              <a:t>10/9/2019</a:t>
+              <a:t>3/9/2020</a:t>
             </a:fld>
             <a:endParaRPr lang="en-US" dirty="0"/>
           </a:p>
@@ -4620,7 +4619,7 @@
           <a:p>
             <a:fld id="{16359517-56A1-4CAF-BF01-997A9DD231B8}" type="datetimeFigureOut">
               <a:rPr lang="en-US" smtClean="0"/>
-              <a:t>10/9/2019</a:t>
+              <a:t>3/9/2020</a:t>
             </a:fld>
             <a:endParaRPr lang="en-US" dirty="0"/>
           </a:p>
@@ -4733,7 +4732,7 @@
           <a:p>
             <a:fld id="{16359517-56A1-4CAF-BF01-997A9DD231B8}" type="datetimeFigureOut">
               <a:rPr lang="en-US" smtClean="0"/>
-              <a:t>10/9/2019</a:t>
+              <a:t>3/9/2020</a:t>
             </a:fld>
             <a:endParaRPr lang="en-US" dirty="0"/>
           </a:p>
@@ -5044,7 +5043,7 @@
           <a:p>
             <a:fld id="{16359517-56A1-4CAF-BF01-997A9DD231B8}" type="datetimeFigureOut">
               <a:rPr lang="en-US" smtClean="0"/>
-              <a:t>10/9/2019</a:t>
+              <a:t>3/9/2020</a:t>
             </a:fld>
             <a:endParaRPr lang="en-US" dirty="0"/>
           </a:p>
@@ -5332,7 +5331,7 @@
           <a:p>
             <a:fld id="{16359517-56A1-4CAF-BF01-997A9DD231B8}" type="datetimeFigureOut">
               <a:rPr lang="en-US" smtClean="0"/>
-              <a:t>10/9/2019</a:t>
+              <a:t>3/9/2020</a:t>
             </a:fld>
             <a:endParaRPr lang="en-US" dirty="0"/>
           </a:p>
@@ -5573,7 +5572,7 @@
           <a:p>
             <a:fld id="{16359517-56A1-4CAF-BF01-997A9DD231B8}" type="datetimeFigureOut">
               <a:rPr lang="en-US" smtClean="0"/>
-              <a:t>10/9/2019</a:t>
+              <a:t>3/9/2020</a:t>
             </a:fld>
             <a:endParaRPr lang="en-US" dirty="0"/>
           </a:p>
@@ -6014,12 +6013,12 @@
         </p:spPr>
         <p:txBody>
           <a:bodyPr>
-            <a:normAutofit fontScale="90000"/>
+            <a:noAutofit/>
           </a:bodyPr>
           <a:lstStyle/>
           <a:p>
             <a:r>
-              <a:rPr lang="en-US" u="sng" dirty="0">
+              <a:rPr lang="en-US" sz="4400" u="sng" dirty="0">
                 <a:solidFill>
                   <a:srgbClr val="0070C0"/>
                 </a:solidFill>
@@ -6027,13 +6026,13 @@
               <a:t>Group 5 Project 1</a:t>
             </a:r>
             <a:br>
-              <a:rPr lang="en-US" u="sng" dirty="0"/>
+              <a:rPr lang="en-US" sz="4400" u="sng" dirty="0"/>
             </a:br>
             <a:br>
-              <a:rPr lang="en-US" dirty="0"/>
+              <a:rPr lang="en-US" sz="4400" dirty="0"/>
             </a:br>
             <a:r>
-              <a:rPr lang="en-US" b="1" i="1" dirty="0">
+              <a:rPr lang="en-US" sz="4400" b="1" i="1" dirty="0">
                 <a:solidFill>
                   <a:srgbClr val="0070C0"/>
                 </a:solidFill>
@@ -6072,21 +6071,13 @@
           <a:lstStyle/>
           <a:p>
             <a:r>
-              <a:rPr lang="en-US" sz="4000" b="1" dirty="0">
-                <a:solidFill>
-                  <a:srgbClr val="FF0000"/>
-                </a:solidFill>
-              </a:rPr>
+              <a:rPr lang="en-US" sz="3600" dirty="0"/>
               <a:t>By: Jacob, George, David, Matt, Kenneth</a:t>
             </a:r>
           </a:p>
           <a:p>
             <a:r>
-              <a:rPr lang="en-US" sz="4000" b="1" u="sng" dirty="0">
-                <a:solidFill>
-                  <a:srgbClr val="FF0000"/>
-                </a:solidFill>
-              </a:rPr>
+              <a:rPr lang="en-US" sz="3600" u="sng" dirty="0"/>
               <a:t>Found data: NYT API</a:t>
             </a:r>
           </a:p>
@@ -7332,103 +7323,6 @@
           <p:cNvPr id="2" name="Title 1">
             <a:extLst>
               <a:ext uri="{FF2B5EF4-FFF2-40B4-BE49-F238E27FC236}">
-                <a16:creationId xmlns:a16="http://schemas.microsoft.com/office/drawing/2014/main" id="{69A5029D-E92F-4626-AEF5-46CA04560CB2}"/>
-              </a:ext>
-            </a:extLst>
-          </p:cNvPr>
-          <p:cNvSpPr>
-            <a:spLocks noGrp="1"/>
-          </p:cNvSpPr>
-          <p:nvPr>
-            <p:ph type="title"/>
-          </p:nvPr>
-        </p:nvSpPr>
-        <p:spPr>
-          <a:xfrm>
-            <a:off x="838200" y="365125"/>
-            <a:ext cx="10515600" cy="6080499"/>
-          </a:xfrm>
-        </p:spPr>
-        <p:txBody>
-          <a:bodyPr/>
-          <a:lstStyle/>
-          <a:p>
-            <a:r>
-              <a:rPr lang="en-US" dirty="0"/>
-              <a:t>Conclusions:</a:t>
-            </a:r>
-            <a:br>
-              <a:rPr lang="en-US" dirty="0"/>
-            </a:br>
-            <a:br>
-              <a:rPr lang="en-US" dirty="0"/>
-            </a:br>
-            <a:r>
-              <a:rPr lang="en-US" dirty="0"/>
-              <a:t>1) The Data</a:t>
-            </a:r>
-            <a:br>
-              <a:rPr lang="en-US" dirty="0"/>
-            </a:br>
-            <a:br>
-              <a:rPr lang="en-US" dirty="0"/>
-            </a:br>
-            <a:r>
-              <a:rPr lang="en-US" dirty="0"/>
-              <a:t>2) The Data</a:t>
-            </a:r>
-            <a:br>
-              <a:rPr lang="en-US" dirty="0"/>
-            </a:br>
-            <a:br>
-              <a:rPr lang="en-US" dirty="0"/>
-            </a:br>
-            <a:r>
-              <a:rPr lang="en-US" dirty="0"/>
-              <a:t>3) The Data</a:t>
-            </a:r>
-            <a:br>
-              <a:rPr lang="en-US" dirty="0"/>
-            </a:br>
-            <a:endParaRPr lang="en-US" dirty="0"/>
-          </a:p>
-        </p:txBody>
-      </p:sp>
-    </p:spTree>
-    <p:extLst>
-      <p:ext uri="{BB962C8B-B14F-4D97-AF65-F5344CB8AC3E}">
-        <p14:creationId xmlns:p14="http://schemas.microsoft.com/office/powerpoint/2010/main" val="4236557223"/>
-      </p:ext>
-    </p:extLst>
-  </p:cSld>
-  <p:clrMapOvr>
-    <a:masterClrMapping/>
-  </p:clrMapOvr>
-</p:sld>
-</file>
-
-<file path=ppt/slides/slide19.xml><?xml version="1.0" encoding="utf-8"?>
-<p:sld xmlns:a="http://schemas.openxmlformats.org/drawingml/2006/main" xmlns:r="http://schemas.openxmlformats.org/officeDocument/2006/relationships" xmlns:p="http://schemas.openxmlformats.org/presentationml/2006/main">
-  <p:cSld>
-    <p:spTree>
-      <p:nvGrpSpPr>
-        <p:cNvPr id="1" name=""/>
-        <p:cNvGrpSpPr/>
-        <p:nvPr/>
-      </p:nvGrpSpPr>
-      <p:grpSpPr>
-        <a:xfrm>
-          <a:off x="0" y="0"/>
-          <a:ext cx="0" cy="0"/>
-          <a:chOff x="0" y="0"/>
-          <a:chExt cx="0" cy="0"/>
-        </a:xfrm>
-      </p:grpSpPr>
-      <p:sp>
-        <p:nvSpPr>
-          <p:cNvPr id="2" name="Title 1">
-            <a:extLst>
-              <a:ext uri="{FF2B5EF4-FFF2-40B4-BE49-F238E27FC236}">
                 <a16:creationId xmlns:a16="http://schemas.microsoft.com/office/drawing/2014/main" id="{63D87AE4-8F62-41B3-99E4-724A1523D72B}"/>
               </a:ext>
             </a:extLst>
@@ -7454,31 +7348,31 @@
           <a:p>
             <a:pPr algn="ctr"/>
             <a:r>
-              <a:rPr lang="en-US" sz="5300" b="1" dirty="0"/>
+              <a:rPr lang="en-US" sz="4800" b="1" dirty="0"/>
               <a:t>Thank you!</a:t>
-            </a:r>
-            <a:br>
-              <a:rPr lang="en-US" sz="5300" b="1" dirty="0"/>
-            </a:br>
-            <a:r>
-              <a:rPr lang="en-US" sz="5300" b="1" dirty="0"/>
-              <a:t>Group 5</a:t>
-            </a:r>
-            <a:br>
-              <a:rPr lang="en-US" sz="5300" b="1" dirty="0"/>
-            </a:br>
-            <a:r>
-              <a:rPr lang="en-US" sz="4800" b="1" dirty="0"/>
-              <a:t>By: Jacob, George, David, Matt, Kenneth</a:t>
             </a:r>
             <a:br>
               <a:rPr lang="en-US" sz="4800" b="1" dirty="0"/>
             </a:br>
+            <a:r>
+              <a:rPr lang="en-US" sz="4800" b="1" dirty="0"/>
+              <a:t>Group 5</a:t>
+            </a:r>
             <a:br>
-              <a:rPr lang="en-US" sz="5300" b="1" dirty="0"/>
+              <a:rPr lang="en-US" sz="4800" b="1" dirty="0"/>
             </a:br>
             <a:r>
-              <a:rPr lang="en-US" sz="5300" b="1" u="sng" dirty="0"/>
+              <a:rPr lang="en-US" b="1" dirty="0"/>
+              <a:t>By: Jacob, George, David, Matt, Kenneth</a:t>
+            </a:r>
+            <a:br>
+              <a:rPr lang="en-US" b="1" dirty="0"/>
+            </a:br>
+            <a:br>
+              <a:rPr lang="en-US" sz="4800" b="1" dirty="0"/>
+            </a:br>
+            <a:r>
+              <a:rPr lang="en-US" sz="4800" b="1" u="sng" dirty="0"/>
               <a:t>All Data was derived from: NYT API</a:t>
             </a:r>
             <a:br>
@@ -7535,8 +7429,8 @@
         </p:nvSpPr>
         <p:spPr>
           <a:xfrm>
-            <a:off x="1028882" y="1028343"/>
-            <a:ext cx="9761537" cy="4801314"/>
+            <a:off x="1215231" y="965590"/>
+            <a:ext cx="9761537" cy="5078313"/>
           </a:xfrm>
           <a:prstGeom prst="rect">
             <a:avLst/>
@@ -7590,6 +7484,7 @@
             <a:endParaRPr lang="en-US" dirty="0"/>
           </a:p>
           <a:p>
+            <a:pPr algn="ctr"/>
             <a:r>
               <a:rPr lang="en-US" dirty="0"/>
               <a:t>	A:US news will be the most popular genre.</a:t>
@@ -7616,6 +7511,7 @@
             <a:endParaRPr lang="en-US" dirty="0"/>
           </a:p>
           <a:p>
+            <a:pPr algn="ctr"/>
             <a:r>
               <a:rPr lang="en-US" dirty="0"/>
               <a:t>	A: what is the most popular type of article, does that change over different timeframes, finally does that change by most emailed/shared/viewed</a:t>
@@ -7642,9 +7538,14 @@
             <a:endParaRPr lang="en-US" dirty="0"/>
           </a:p>
           <a:p>
+            <a:pPr algn="ctr"/>
             <a:r>
               <a:rPr lang="en-US" dirty="0"/>
-              <a:t>	A: When viewing the charts and interpreting the data the charts answered our questions, they showed that the most viewed is the US articles but over time the most shared are opinion articles.</a:t>
+              <a:t>	</a:t>
+            </a:r>
+            <a:r>
+              <a:rPr lang="en-US" b="1" dirty="0"/>
+              <a:t>A: When viewing the charts and interpreting the data the charts answered our questions, they showed that the most viewed is the US articles but over time the most shared are opinion articles.</a:t>
             </a:r>
           </a:p>
           <a:p>
@@ -7856,7 +7757,7 @@
             <a:pPr algn="ctr"/>
             <a:r>
               <a:rPr lang="en-US" dirty="0"/>
-              <a:t>Emailed</a:t>
+              <a:t>Article Emailed</a:t>
             </a:r>
             <a:br>
               <a:rPr lang="en-US" dirty="0"/>
@@ -8008,7 +7909,7 @@
             <a:pPr algn="ctr"/>
             <a:r>
               <a:rPr lang="en-US" dirty="0"/>
-              <a:t>Emailed </a:t>
+              <a:t>Article Emailed</a:t>
             </a:r>
             <a:br>
               <a:rPr lang="en-US" dirty="0"/>
@@ -8161,7 +8062,7 @@
             <a:pPr algn="ctr"/>
             <a:r>
               <a:rPr lang="en-US" dirty="0"/>
-              <a:t>Emailed</a:t>
+              <a:t>Article Emailed</a:t>
             </a:r>
             <a:br>
               <a:rPr lang="en-US" dirty="0"/>
@@ -8316,8 +8217,8 @@
           <a:p>
             <a:pPr algn="ctr"/>
             <a:r>
-              <a:rPr lang="en-US" dirty="0"/>
-              <a:t>EMAILED TOTAL:</a:t>
+              <a:rPr lang="en-US" sz="2800" dirty="0"/>
+              <a:t>Article Emailed TOTAL:</a:t>
             </a:r>
             <a:br>
               <a:rPr lang="en-US" dirty="0"/>

</xml_diff>